<commit_message>
finish from my side
</commit_message>
<xml_diff>
--- a/Final_Project/Material_for_Documentation/File_Structure_Figures.pptx
+++ b/Final_Project/Material_for_Documentation/File_Structure_Figures.pptx
@@ -113,23 +113,87 @@
 </p:presentation>
 </file>
 
+<file path=ppt/revisionInfo.xml><?xml version="1.0" encoding="utf-8"?>
+<p1510:revInfo xmlns:a="http://schemas.openxmlformats.org/drawingml/2006/main" xmlns:r="http://schemas.openxmlformats.org/officeDocument/2006/relationships" xmlns:p1510="http://schemas.microsoft.com/office/powerpoint/2015/10/main">
+  <p1510:revLst>
+    <p1510:client id="{1F014B3F-C013-4974-9FCF-76F973B103FD}" v="5" dt="2021-04-03T09:48:10.934"/>
+  </p1510:revLst>
+</p1510:revInfo>
+</file>
+
 <file path=ppt/changesInfos/changesInfo1.xml><?xml version="1.0" encoding="utf-8"?>
 <pc:chgInfo xmlns:a="http://schemas.openxmlformats.org/drawingml/2006/main" xmlns:r="http://schemas.openxmlformats.org/officeDocument/2006/relationships" xmlns:ac="http://schemas.microsoft.com/office/drawing/2013/main/command" xmlns:pc="http://schemas.microsoft.com/office/powerpoint/2013/main/command">
   <pc:docChgLst>
     <pc:chgData name="Jacqueline N" userId="7febc520ade5fca9" providerId="LiveId" clId="{1F014B3F-C013-4974-9FCF-76F973B103FD}"/>
-    <pc:docChg chg="modSld">
-      <pc:chgData name="Jacqueline N" userId="7febc520ade5fca9" providerId="LiveId" clId="{1F014B3F-C013-4974-9FCF-76F973B103FD}" dt="2021-04-03T09:20:22.166" v="142"/>
+    <pc:docChg chg="custSel modSld">
+      <pc:chgData name="Jacqueline N" userId="7febc520ade5fca9" providerId="LiveId" clId="{1F014B3F-C013-4974-9FCF-76F973B103FD}" dt="2021-04-03T09:48:30.764" v="389" actId="1037"/>
       <pc:docMkLst>
         <pc:docMk/>
       </pc:docMkLst>
-      <pc:sldChg chg="modSp mod">
-        <pc:chgData name="Jacqueline N" userId="7febc520ade5fca9" providerId="LiveId" clId="{1F014B3F-C013-4974-9FCF-76F973B103FD}" dt="2021-04-03T09:20:22.166" v="142"/>
+      <pc:sldChg chg="addSp delSp modSp mod">
+        <pc:chgData name="Jacqueline N" userId="7febc520ade5fca9" providerId="LiveId" clId="{1F014B3F-C013-4974-9FCF-76F973B103FD}" dt="2021-04-03T09:48:30.764" v="389" actId="1037"/>
         <pc:sldMkLst>
           <pc:docMk/>
           <pc:sldMk cId="2598956538" sldId="257"/>
         </pc:sldMkLst>
+        <pc:spChg chg="add mod">
+          <ac:chgData name="Jacqueline N" userId="7febc520ade5fca9" providerId="LiveId" clId="{1F014B3F-C013-4974-9FCF-76F973B103FD}" dt="2021-04-03T09:47:24.509" v="207" actId="1076"/>
+          <ac:spMkLst>
+            <pc:docMk/>
+            <pc:sldMk cId="2598956538" sldId="257"/>
+            <ac:spMk id="33" creationId="{08CDEBDC-8859-4B55-AC2B-F471A719DDDB}"/>
+          </ac:spMkLst>
+        </pc:spChg>
+        <pc:spChg chg="add mod">
+          <ac:chgData name="Jacqueline N" userId="7febc520ade5fca9" providerId="LiveId" clId="{1F014B3F-C013-4974-9FCF-76F973B103FD}" dt="2021-04-03T09:47:37.167" v="210" actId="1076"/>
+          <ac:spMkLst>
+            <pc:docMk/>
+            <pc:sldMk cId="2598956538" sldId="257"/>
+            <ac:spMk id="34" creationId="{EC434725-519C-4493-BA31-DDC71A3E4D0C}"/>
+          </ac:spMkLst>
+        </pc:spChg>
+        <pc:spChg chg="add mod">
+          <ac:chgData name="Jacqueline N" userId="7febc520ade5fca9" providerId="LiveId" clId="{1F014B3F-C013-4974-9FCF-76F973B103FD}" dt="2021-04-03T09:47:53.797" v="213" actId="571"/>
+          <ac:spMkLst>
+            <pc:docMk/>
+            <pc:sldMk cId="2598956538" sldId="257"/>
+            <ac:spMk id="35" creationId="{E04B8EAC-436B-41E9-BB25-2C352ACBD030}"/>
+          </ac:spMkLst>
+        </pc:spChg>
+        <pc:spChg chg="add mod">
+          <ac:chgData name="Jacqueline N" userId="7febc520ade5fca9" providerId="LiveId" clId="{1F014B3F-C013-4974-9FCF-76F973B103FD}" dt="2021-04-03T09:47:53.797" v="213" actId="571"/>
+          <ac:spMkLst>
+            <pc:docMk/>
+            <pc:sldMk cId="2598956538" sldId="257"/>
+            <ac:spMk id="36" creationId="{D5FAE8E4-F2ED-4EFC-AB01-18F5998C7EE4}"/>
+          </ac:spMkLst>
+        </pc:spChg>
+        <pc:spChg chg="add mod">
+          <ac:chgData name="Jacqueline N" userId="7febc520ade5fca9" providerId="LiveId" clId="{1F014B3F-C013-4974-9FCF-76F973B103FD}" dt="2021-04-03T09:48:09.077" v="302" actId="1038"/>
+          <ac:spMkLst>
+            <pc:docMk/>
+            <pc:sldMk cId="2598956538" sldId="257"/>
+            <ac:spMk id="37" creationId="{98B8FD18-9357-4E22-9EDD-1431BC382BCC}"/>
+          </ac:spMkLst>
+        </pc:spChg>
+        <pc:spChg chg="add mod">
+          <ac:chgData name="Jacqueline N" userId="7febc520ade5fca9" providerId="LiveId" clId="{1F014B3F-C013-4974-9FCF-76F973B103FD}" dt="2021-04-03T09:48:09.077" v="302" actId="1038"/>
+          <ac:spMkLst>
+            <pc:docMk/>
+            <pc:sldMk cId="2598956538" sldId="257"/>
+            <ac:spMk id="38" creationId="{7CFE4C23-2EBB-40D8-8B26-8658D490CC5A}"/>
+          </ac:spMkLst>
+        </pc:spChg>
+        <pc:spChg chg="add mod">
+          <ac:chgData name="Jacqueline N" userId="7febc520ade5fca9" providerId="LiveId" clId="{1F014B3F-C013-4974-9FCF-76F973B103FD}" dt="2021-04-03T09:48:09.077" v="302" actId="1038"/>
+          <ac:spMkLst>
+            <pc:docMk/>
+            <pc:sldMk cId="2598956538" sldId="257"/>
+            <ac:spMk id="39" creationId="{FF2BA3A4-25D2-4695-AFBA-A2B1F3FE8680}"/>
+          </ac:spMkLst>
+        </pc:spChg>
         <pc:spChg chg="mod">
-          <ac:chgData name="Jacqueline N" userId="7febc520ade5fca9" providerId="LiveId" clId="{1F014B3F-C013-4974-9FCF-76F973B103FD}" dt="2021-04-03T09:19:30.688" v="124" actId="20577"/>
+          <ac:chgData name="Jacqueline N" userId="7febc520ade5fca9" providerId="LiveId" clId="{1F014B3F-C013-4974-9FCF-76F973B103FD}" dt="2021-04-03T09:46:59.546" v="148" actId="1037"/>
           <ac:spMkLst>
             <pc:docMk/>
             <pc:sldMk cId="2598956538" sldId="257"/>
@@ -144,8 +208,8 @@
             <ac:spMk id="46" creationId="{E650C814-367D-4B3E-BB2C-D5B206B359F4}"/>
           </ac:spMkLst>
         </pc:spChg>
-        <pc:spChg chg="mod">
-          <ac:chgData name="Jacqueline N" userId="7febc520ade5fca9" providerId="LiveId" clId="{1F014B3F-C013-4974-9FCF-76F973B103FD}" dt="2021-04-03T09:19:43.319" v="125"/>
+        <pc:spChg chg="del mod">
+          <ac:chgData name="Jacqueline N" userId="7febc520ade5fca9" providerId="LiveId" clId="{1F014B3F-C013-4974-9FCF-76F973B103FD}" dt="2021-04-03T09:47:04.030" v="149" actId="478"/>
           <ac:spMkLst>
             <pc:docMk/>
             <pc:sldMk cId="2598956538" sldId="257"/>
@@ -160,8 +224,8 @@
             <ac:spMk id="48" creationId="{7FAF93A1-93C7-468B-85F2-E58626D4830F}"/>
           </ac:spMkLst>
         </pc:spChg>
-        <pc:spChg chg="mod">
-          <ac:chgData name="Jacqueline N" userId="7febc520ade5fca9" providerId="LiveId" clId="{1F014B3F-C013-4974-9FCF-76F973B103FD}" dt="2021-04-03T09:20:09.927" v="136"/>
+        <pc:spChg chg="del mod">
+          <ac:chgData name="Jacqueline N" userId="7febc520ade5fca9" providerId="LiveId" clId="{1F014B3F-C013-4974-9FCF-76F973B103FD}" dt="2021-04-03T09:47:30.195" v="208" actId="478"/>
           <ac:spMkLst>
             <pc:docMk/>
             <pc:sldMk cId="2598956538" sldId="257"/>
@@ -176,8 +240,8 @@
             <ac:spMk id="50" creationId="{CAA1803D-3149-4502-A9E9-BF8DD70D20BE}"/>
           </ac:spMkLst>
         </pc:spChg>
-        <pc:spChg chg="mod">
-          <ac:chgData name="Jacqueline N" userId="7febc520ade5fca9" providerId="LiveId" clId="{1F014B3F-C013-4974-9FCF-76F973B103FD}" dt="2021-04-03T09:20:12.260" v="137"/>
+        <pc:spChg chg="del mod">
+          <ac:chgData name="Jacqueline N" userId="7febc520ade5fca9" providerId="LiveId" clId="{1F014B3F-C013-4974-9FCF-76F973B103FD}" dt="2021-04-03T09:47:46.787" v="211" actId="478"/>
           <ac:spMkLst>
             <pc:docMk/>
             <pc:sldMk cId="2598956538" sldId="257"/>
@@ -192,8 +256,8 @@
             <ac:spMk id="55" creationId="{6081F44D-BFD9-457C-B7A8-D9CC2A71C1E7}"/>
           </ac:spMkLst>
         </pc:spChg>
-        <pc:spChg chg="mod">
-          <ac:chgData name="Jacqueline N" userId="7febc520ade5fca9" providerId="LiveId" clId="{1F014B3F-C013-4974-9FCF-76F973B103FD}" dt="2021-04-03T09:20:14.115" v="138"/>
+        <pc:spChg chg="del mod">
+          <ac:chgData name="Jacqueline N" userId="7febc520ade5fca9" providerId="LiveId" clId="{1F014B3F-C013-4974-9FCF-76F973B103FD}" dt="2021-04-03T09:47:46.787" v="211" actId="478"/>
           <ac:spMkLst>
             <pc:docMk/>
             <pc:sldMk cId="2598956538" sldId="257"/>
@@ -208,8 +272,8 @@
             <ac:spMk id="57" creationId="{AA586810-6163-42E4-B431-0A651970162E}"/>
           </ac:spMkLst>
         </pc:spChg>
-        <pc:spChg chg="mod">
-          <ac:chgData name="Jacqueline N" userId="7febc520ade5fca9" providerId="LiveId" clId="{1F014B3F-C013-4974-9FCF-76F973B103FD}" dt="2021-04-03T09:20:16.409" v="139"/>
+        <pc:spChg chg="del mod">
+          <ac:chgData name="Jacqueline N" userId="7febc520ade5fca9" providerId="LiveId" clId="{1F014B3F-C013-4974-9FCF-76F973B103FD}" dt="2021-04-03T09:47:46.787" v="211" actId="478"/>
           <ac:spMkLst>
             <pc:docMk/>
             <pc:sldMk cId="2598956538" sldId="257"/>
@@ -224,8 +288,8 @@
             <ac:spMk id="59" creationId="{1783B4E1-4770-433F-A0F9-CB57D771C39C}"/>
           </ac:spMkLst>
         </pc:spChg>
-        <pc:spChg chg="mod">
-          <ac:chgData name="Jacqueline N" userId="7febc520ade5fca9" providerId="LiveId" clId="{1F014B3F-C013-4974-9FCF-76F973B103FD}" dt="2021-04-03T09:20:18.561" v="140"/>
+        <pc:spChg chg="del mod">
+          <ac:chgData name="Jacqueline N" userId="7febc520ade5fca9" providerId="LiveId" clId="{1F014B3F-C013-4974-9FCF-76F973B103FD}" dt="2021-04-03T09:47:50.971" v="212" actId="478"/>
           <ac:spMkLst>
             <pc:docMk/>
             <pc:sldMk cId="2598956538" sldId="257"/>
@@ -240,8 +304,8 @@
             <ac:spMk id="64" creationId="{924DA8FC-CBAA-4C9F-88D1-FA85098F6914}"/>
           </ac:spMkLst>
         </pc:spChg>
-        <pc:spChg chg="mod">
-          <ac:chgData name="Jacqueline N" userId="7febc520ade5fca9" providerId="LiveId" clId="{1F014B3F-C013-4974-9FCF-76F973B103FD}" dt="2021-04-03T09:20:20.250" v="141"/>
+        <pc:spChg chg="del mod">
+          <ac:chgData name="Jacqueline N" userId="7febc520ade5fca9" providerId="LiveId" clId="{1F014B3F-C013-4974-9FCF-76F973B103FD}" dt="2021-04-03T09:47:50.971" v="212" actId="478"/>
           <ac:spMkLst>
             <pc:docMk/>
             <pc:sldMk cId="2598956538" sldId="257"/>
@@ -256,8 +320,8 @@
             <ac:spMk id="66" creationId="{E7013083-3B4D-4DB3-A18B-7578595BBE5D}"/>
           </ac:spMkLst>
         </pc:spChg>
-        <pc:spChg chg="mod">
-          <ac:chgData name="Jacqueline N" userId="7febc520ade5fca9" providerId="LiveId" clId="{1F014B3F-C013-4974-9FCF-76F973B103FD}" dt="2021-04-03T09:20:22.166" v="142"/>
+        <pc:spChg chg="del mod">
+          <ac:chgData name="Jacqueline N" userId="7febc520ade5fca9" providerId="LiveId" clId="{1F014B3F-C013-4974-9FCF-76F973B103FD}" dt="2021-04-03T09:47:50.971" v="212" actId="478"/>
           <ac:spMkLst>
             <pc:docMk/>
             <pc:sldMk cId="2598956538" sldId="257"/>
@@ -270,6 +334,30 @@
             <pc:docMk/>
             <pc:sldMk cId="2598956538" sldId="257"/>
             <ac:spMk id="68" creationId="{EB4D6049-859B-4C2E-8B72-1ED344DE2C33}"/>
+          </ac:spMkLst>
+        </pc:spChg>
+        <pc:spChg chg="add mod">
+          <ac:chgData name="Jacqueline N" userId="7febc520ade5fca9" providerId="LiveId" clId="{1F014B3F-C013-4974-9FCF-76F973B103FD}" dt="2021-04-03T09:48:30.764" v="389" actId="1037"/>
+          <ac:spMkLst>
+            <pc:docMk/>
+            <pc:sldMk cId="2598956538" sldId="257"/>
+            <ac:spMk id="69" creationId="{EE4B6165-1D81-4784-9AFC-4B8B94831217}"/>
+          </ac:spMkLst>
+        </pc:spChg>
+        <pc:spChg chg="add mod">
+          <ac:chgData name="Jacqueline N" userId="7febc520ade5fca9" providerId="LiveId" clId="{1F014B3F-C013-4974-9FCF-76F973B103FD}" dt="2021-04-03T09:48:30.764" v="389" actId="1037"/>
+          <ac:spMkLst>
+            <pc:docMk/>
+            <pc:sldMk cId="2598956538" sldId="257"/>
+            <ac:spMk id="70" creationId="{EF21AA87-B332-4BD4-B1AC-F4D2EAB64714}"/>
+          </ac:spMkLst>
+        </pc:spChg>
+        <pc:spChg chg="add mod">
+          <ac:chgData name="Jacqueline N" userId="7febc520ade5fca9" providerId="LiveId" clId="{1F014B3F-C013-4974-9FCF-76F973B103FD}" dt="2021-04-03T09:48:30.764" v="389" actId="1037"/>
+          <ac:spMkLst>
+            <pc:docMk/>
+            <pc:sldMk cId="2598956538" sldId="257"/>
+            <ac:spMk id="71" creationId="{423AD83E-9395-42DF-A018-8AD4709EBAA8}"/>
           </ac:spMkLst>
         </pc:spChg>
       </pc:sldChg>
@@ -4362,8 +4450,8 @@
         </p:nvSpPr>
         <p:spPr>
           <a:xfrm>
-            <a:off x="346365" y="1544782"/>
-            <a:ext cx="1524001" cy="1184563"/>
+            <a:off x="335975" y="1544782"/>
+            <a:ext cx="1591540" cy="1184563"/>
           </a:xfrm>
           <a:prstGeom prst="rect">
             <a:avLst/>
@@ -4408,7 +4496,15 @@
             </a:r>
             <a:r>
               <a:rPr lang="de-DE" sz="1600" b="1" dirty="0"/>
-              <a:t> of </a:t>
+              <a:t> </a:t>
+            </a:r>
+            <a:r>
+              <a:rPr lang="de-DE" sz="1600" b="1" dirty="0" err="1"/>
+              <a:t>for</a:t>
+            </a:r>
+            <a:r>
+              <a:rPr lang="de-DE" sz="1600" b="1" dirty="0"/>
+              <a:t> </a:t>
             </a:r>
             <a:r>
               <a:rPr lang="de-DE" sz="1600" b="1" dirty="0" err="1"/>
@@ -4485,84 +4581,6 @@
       </p:sp>
       <p:sp>
         <p:nvSpPr>
-          <p:cNvPr id="47" name="Rechteck 46">
-            <a:extLst>
-              <a:ext uri="{FF2B5EF4-FFF2-40B4-BE49-F238E27FC236}">
-                <a16:creationId xmlns:a16="http://schemas.microsoft.com/office/drawing/2014/main" id="{111F602C-DA50-4CA2-A595-40670B3CEE35}"/>
-              </a:ext>
-            </a:extLst>
-          </p:cNvPr>
-          <p:cNvSpPr/>
-          <p:nvPr/>
-        </p:nvSpPr>
-        <p:spPr>
-          <a:xfrm>
-            <a:off x="346365" y="3408219"/>
-            <a:ext cx="1524001" cy="1184563"/>
-          </a:xfrm>
-          <a:prstGeom prst="rect">
-            <a:avLst/>
-          </a:prstGeom>
-        </p:spPr>
-        <p:style>
-          <a:lnRef idx="2">
-            <a:schemeClr val="accent3">
-              <a:shade val="50000"/>
-            </a:schemeClr>
-          </a:lnRef>
-          <a:fillRef idx="1">
-            <a:schemeClr val="accent3"/>
-          </a:fillRef>
-          <a:effectRef idx="0">
-            <a:schemeClr val="accent3"/>
-          </a:effectRef>
-          <a:fontRef idx="minor">
-            <a:schemeClr val="lt1"/>
-          </a:fontRef>
-        </p:style>
-        <p:txBody>
-          <a:bodyPr rtlCol="0" anchor="ctr"/>
-          <a:lstStyle/>
-          <a:p>
-            <a:pPr algn="ctr"/>
-            <a:r>
-              <a:rPr lang="de-DE" sz="1600" b="1" dirty="0"/>
-              <a:t>.</a:t>
-            </a:r>
-            <a:r>
-              <a:rPr lang="de-DE" sz="1600" b="1" dirty="0" err="1"/>
-              <a:t>csv</a:t>
-            </a:r>
-            <a:r>
-              <a:rPr lang="de-DE" sz="1600" b="1" dirty="0"/>
-              <a:t> </a:t>
-            </a:r>
-            <a:r>
-              <a:rPr lang="de-DE" sz="1600" b="1" dirty="0" err="1"/>
-              <a:t>files</a:t>
-            </a:r>
-            <a:r>
-              <a:rPr lang="de-DE" sz="1600" b="1" dirty="0"/>
-              <a:t> of </a:t>
-            </a:r>
-            <a:r>
-              <a:rPr lang="de-DE" sz="1600" b="1" dirty="0" err="1"/>
-              <a:t>loss</a:t>
-            </a:r>
-            <a:r>
-              <a:rPr lang="de-DE" sz="1600" b="1" dirty="0"/>
-              <a:t> </a:t>
-            </a:r>
-            <a:r>
-              <a:rPr lang="de-DE" sz="1600" b="1" dirty="0" err="1"/>
-              <a:t>documentation</a:t>
-            </a:r>
-            <a:endParaRPr lang="de-DE" sz="1600" b="1" dirty="0"/>
-          </a:p>
-        </p:txBody>
-      </p:sp>
-      <p:sp>
-        <p:nvSpPr>
           <p:cNvPr id="48" name="Rechteck 47">
             <a:extLst>
               <a:ext uri="{FF2B5EF4-FFF2-40B4-BE49-F238E27FC236}">
@@ -4620,84 +4638,6 @@
       </p:sp>
       <p:sp>
         <p:nvSpPr>
-          <p:cNvPr id="49" name="Rechteck 48">
-            <a:extLst>
-              <a:ext uri="{FF2B5EF4-FFF2-40B4-BE49-F238E27FC236}">
-                <a16:creationId xmlns:a16="http://schemas.microsoft.com/office/drawing/2014/main" id="{B9D0A040-56BB-45DA-AC29-74AA6CD69BE3}"/>
-              </a:ext>
-            </a:extLst>
-          </p:cNvPr>
-          <p:cNvSpPr/>
-          <p:nvPr/>
-        </p:nvSpPr>
-        <p:spPr>
-          <a:xfrm>
-            <a:off x="346365" y="5243945"/>
-            <a:ext cx="1524001" cy="1184563"/>
-          </a:xfrm>
-          <a:prstGeom prst="rect">
-            <a:avLst/>
-          </a:prstGeom>
-        </p:spPr>
-        <p:style>
-          <a:lnRef idx="2">
-            <a:schemeClr val="accent3">
-              <a:shade val="50000"/>
-            </a:schemeClr>
-          </a:lnRef>
-          <a:fillRef idx="1">
-            <a:schemeClr val="accent3"/>
-          </a:fillRef>
-          <a:effectRef idx="0">
-            <a:schemeClr val="accent3"/>
-          </a:effectRef>
-          <a:fontRef idx="minor">
-            <a:schemeClr val="lt1"/>
-          </a:fontRef>
-        </p:style>
-        <p:txBody>
-          <a:bodyPr rtlCol="0" anchor="ctr"/>
-          <a:lstStyle/>
-          <a:p>
-            <a:pPr algn="ctr"/>
-            <a:r>
-              <a:rPr lang="de-DE" sz="1600" b="1" dirty="0"/>
-              <a:t>.</a:t>
-            </a:r>
-            <a:r>
-              <a:rPr lang="de-DE" sz="1600" b="1" dirty="0" err="1"/>
-              <a:t>csv</a:t>
-            </a:r>
-            <a:r>
-              <a:rPr lang="de-DE" sz="1600" b="1" dirty="0"/>
-              <a:t> </a:t>
-            </a:r>
-            <a:r>
-              <a:rPr lang="de-DE" sz="1600" b="1" dirty="0" err="1"/>
-              <a:t>files</a:t>
-            </a:r>
-            <a:r>
-              <a:rPr lang="de-DE" sz="1600" b="1" dirty="0"/>
-              <a:t> of </a:t>
-            </a:r>
-            <a:r>
-              <a:rPr lang="de-DE" sz="1600" b="1" dirty="0" err="1"/>
-              <a:t>loss</a:t>
-            </a:r>
-            <a:r>
-              <a:rPr lang="de-DE" sz="1600" b="1" dirty="0"/>
-              <a:t> </a:t>
-            </a:r>
-            <a:r>
-              <a:rPr lang="de-DE" sz="1600" b="1" dirty="0" err="1"/>
-              <a:t>documentation</a:t>
-            </a:r>
-            <a:endParaRPr lang="de-DE" sz="1600" b="1" dirty="0"/>
-          </a:p>
-        </p:txBody>
-      </p:sp>
-      <p:sp>
-        <p:nvSpPr>
           <p:cNvPr id="50" name="Rechteck 49">
             <a:extLst>
               <a:ext uri="{FF2B5EF4-FFF2-40B4-BE49-F238E27FC236}">
@@ -4905,84 +4845,6 @@
       </p:sp>
       <p:sp>
         <p:nvSpPr>
-          <p:cNvPr id="54" name="Rechteck 53">
-            <a:extLst>
-              <a:ext uri="{FF2B5EF4-FFF2-40B4-BE49-F238E27FC236}">
-                <a16:creationId xmlns:a16="http://schemas.microsoft.com/office/drawing/2014/main" id="{7EFFA7BE-B777-4838-BCB6-34B1A6C1146F}"/>
-              </a:ext>
-            </a:extLst>
-          </p:cNvPr>
-          <p:cNvSpPr/>
-          <p:nvPr/>
-        </p:nvSpPr>
-        <p:spPr>
-          <a:xfrm>
-            <a:off x="4381499" y="1544782"/>
-            <a:ext cx="1524001" cy="1184563"/>
-          </a:xfrm>
-          <a:prstGeom prst="rect">
-            <a:avLst/>
-          </a:prstGeom>
-        </p:spPr>
-        <p:style>
-          <a:lnRef idx="2">
-            <a:schemeClr val="accent3">
-              <a:shade val="50000"/>
-            </a:schemeClr>
-          </a:lnRef>
-          <a:fillRef idx="1">
-            <a:schemeClr val="accent3"/>
-          </a:fillRef>
-          <a:effectRef idx="0">
-            <a:schemeClr val="accent3"/>
-          </a:effectRef>
-          <a:fontRef idx="minor">
-            <a:schemeClr val="lt1"/>
-          </a:fontRef>
-        </p:style>
-        <p:txBody>
-          <a:bodyPr rtlCol="0" anchor="ctr"/>
-          <a:lstStyle/>
-          <a:p>
-            <a:pPr algn="ctr"/>
-            <a:r>
-              <a:rPr lang="de-DE" sz="1600" b="1" dirty="0"/>
-              <a:t>.</a:t>
-            </a:r>
-            <a:r>
-              <a:rPr lang="de-DE" sz="1600" b="1" dirty="0" err="1"/>
-              <a:t>csv</a:t>
-            </a:r>
-            <a:r>
-              <a:rPr lang="de-DE" sz="1600" b="1" dirty="0"/>
-              <a:t> </a:t>
-            </a:r>
-            <a:r>
-              <a:rPr lang="de-DE" sz="1600" b="1" dirty="0" err="1"/>
-              <a:t>files</a:t>
-            </a:r>
-            <a:r>
-              <a:rPr lang="de-DE" sz="1600" b="1" dirty="0"/>
-              <a:t> of </a:t>
-            </a:r>
-            <a:r>
-              <a:rPr lang="de-DE" sz="1600" b="1" dirty="0" err="1"/>
-              <a:t>loss</a:t>
-            </a:r>
-            <a:r>
-              <a:rPr lang="de-DE" sz="1600" b="1" dirty="0"/>
-              <a:t> </a:t>
-            </a:r>
-            <a:r>
-              <a:rPr lang="de-DE" sz="1600" b="1" dirty="0" err="1"/>
-              <a:t>documentation</a:t>
-            </a:r>
-            <a:endParaRPr lang="de-DE" sz="1600" b="1" dirty="0"/>
-          </a:p>
-        </p:txBody>
-      </p:sp>
-      <p:sp>
-        <p:nvSpPr>
           <p:cNvPr id="55" name="Rechteck 54">
             <a:extLst>
               <a:ext uri="{FF2B5EF4-FFF2-40B4-BE49-F238E27FC236}">
@@ -5040,84 +4902,6 @@
       </p:sp>
       <p:sp>
         <p:nvSpPr>
-          <p:cNvPr id="56" name="Rechteck 55">
-            <a:extLst>
-              <a:ext uri="{FF2B5EF4-FFF2-40B4-BE49-F238E27FC236}">
-                <a16:creationId xmlns:a16="http://schemas.microsoft.com/office/drawing/2014/main" id="{EB4312DE-3872-4009-AA35-6400FD8B3736}"/>
-              </a:ext>
-            </a:extLst>
-          </p:cNvPr>
-          <p:cNvSpPr/>
-          <p:nvPr/>
-        </p:nvSpPr>
-        <p:spPr>
-          <a:xfrm>
-            <a:off x="4381499" y="3408219"/>
-            <a:ext cx="1524001" cy="1184563"/>
-          </a:xfrm>
-          <a:prstGeom prst="rect">
-            <a:avLst/>
-          </a:prstGeom>
-        </p:spPr>
-        <p:style>
-          <a:lnRef idx="2">
-            <a:schemeClr val="accent3">
-              <a:shade val="50000"/>
-            </a:schemeClr>
-          </a:lnRef>
-          <a:fillRef idx="1">
-            <a:schemeClr val="accent3"/>
-          </a:fillRef>
-          <a:effectRef idx="0">
-            <a:schemeClr val="accent3"/>
-          </a:effectRef>
-          <a:fontRef idx="minor">
-            <a:schemeClr val="lt1"/>
-          </a:fontRef>
-        </p:style>
-        <p:txBody>
-          <a:bodyPr rtlCol="0" anchor="ctr"/>
-          <a:lstStyle/>
-          <a:p>
-            <a:pPr algn="ctr"/>
-            <a:r>
-              <a:rPr lang="de-DE" sz="1600" b="1" dirty="0"/>
-              <a:t>.</a:t>
-            </a:r>
-            <a:r>
-              <a:rPr lang="de-DE" sz="1600" b="1" dirty="0" err="1"/>
-              <a:t>csv</a:t>
-            </a:r>
-            <a:r>
-              <a:rPr lang="de-DE" sz="1600" b="1" dirty="0"/>
-              <a:t> </a:t>
-            </a:r>
-            <a:r>
-              <a:rPr lang="de-DE" sz="1600" b="1" dirty="0" err="1"/>
-              <a:t>files</a:t>
-            </a:r>
-            <a:r>
-              <a:rPr lang="de-DE" sz="1600" b="1" dirty="0"/>
-              <a:t> of </a:t>
-            </a:r>
-            <a:r>
-              <a:rPr lang="de-DE" sz="1600" b="1" dirty="0" err="1"/>
-              <a:t>loss</a:t>
-            </a:r>
-            <a:r>
-              <a:rPr lang="de-DE" sz="1600" b="1" dirty="0"/>
-              <a:t> </a:t>
-            </a:r>
-            <a:r>
-              <a:rPr lang="de-DE" sz="1600" b="1" dirty="0" err="1"/>
-              <a:t>documentation</a:t>
-            </a:r>
-            <a:endParaRPr lang="de-DE" sz="1600" b="1" dirty="0"/>
-          </a:p>
-        </p:txBody>
-      </p:sp>
-      <p:sp>
-        <p:nvSpPr>
           <p:cNvPr id="57" name="Rechteck 56">
             <a:extLst>
               <a:ext uri="{FF2B5EF4-FFF2-40B4-BE49-F238E27FC236}">
@@ -5175,84 +4959,6 @@
       </p:sp>
       <p:sp>
         <p:nvSpPr>
-          <p:cNvPr id="58" name="Rechteck 57">
-            <a:extLst>
-              <a:ext uri="{FF2B5EF4-FFF2-40B4-BE49-F238E27FC236}">
-                <a16:creationId xmlns:a16="http://schemas.microsoft.com/office/drawing/2014/main" id="{03D0E7D9-66FB-4B0A-A103-1735887D1B93}"/>
-              </a:ext>
-            </a:extLst>
-          </p:cNvPr>
-          <p:cNvSpPr/>
-          <p:nvPr/>
-        </p:nvSpPr>
-        <p:spPr>
-          <a:xfrm>
-            <a:off x="4381499" y="5243945"/>
-            <a:ext cx="1524001" cy="1184563"/>
-          </a:xfrm>
-          <a:prstGeom prst="rect">
-            <a:avLst/>
-          </a:prstGeom>
-        </p:spPr>
-        <p:style>
-          <a:lnRef idx="2">
-            <a:schemeClr val="accent3">
-              <a:shade val="50000"/>
-            </a:schemeClr>
-          </a:lnRef>
-          <a:fillRef idx="1">
-            <a:schemeClr val="accent3"/>
-          </a:fillRef>
-          <a:effectRef idx="0">
-            <a:schemeClr val="accent3"/>
-          </a:effectRef>
-          <a:fontRef idx="minor">
-            <a:schemeClr val="lt1"/>
-          </a:fontRef>
-        </p:style>
-        <p:txBody>
-          <a:bodyPr rtlCol="0" anchor="ctr"/>
-          <a:lstStyle/>
-          <a:p>
-            <a:pPr algn="ctr"/>
-            <a:r>
-              <a:rPr lang="de-DE" sz="1600" b="1" dirty="0"/>
-              <a:t>.</a:t>
-            </a:r>
-            <a:r>
-              <a:rPr lang="de-DE" sz="1600" b="1" dirty="0" err="1"/>
-              <a:t>csv</a:t>
-            </a:r>
-            <a:r>
-              <a:rPr lang="de-DE" sz="1600" b="1" dirty="0"/>
-              <a:t> </a:t>
-            </a:r>
-            <a:r>
-              <a:rPr lang="de-DE" sz="1600" b="1" dirty="0" err="1"/>
-              <a:t>files</a:t>
-            </a:r>
-            <a:r>
-              <a:rPr lang="de-DE" sz="1600" b="1" dirty="0"/>
-              <a:t> of </a:t>
-            </a:r>
-            <a:r>
-              <a:rPr lang="de-DE" sz="1600" b="1" dirty="0" err="1"/>
-              <a:t>loss</a:t>
-            </a:r>
-            <a:r>
-              <a:rPr lang="de-DE" sz="1600" b="1" dirty="0"/>
-              <a:t> </a:t>
-            </a:r>
-            <a:r>
-              <a:rPr lang="de-DE" sz="1600" b="1" dirty="0" err="1"/>
-              <a:t>documentation</a:t>
-            </a:r>
-            <a:endParaRPr lang="de-DE" sz="1600" b="1" dirty="0"/>
-          </a:p>
-        </p:txBody>
-      </p:sp>
-      <p:sp>
-        <p:nvSpPr>
           <p:cNvPr id="59" name="Rechteck 58">
             <a:extLst>
               <a:ext uri="{FF2B5EF4-FFF2-40B4-BE49-F238E27FC236}">
@@ -5460,84 +5166,6 @@
       </p:sp>
       <p:sp>
         <p:nvSpPr>
-          <p:cNvPr id="63" name="Rechteck 62">
-            <a:extLst>
-              <a:ext uri="{FF2B5EF4-FFF2-40B4-BE49-F238E27FC236}">
-                <a16:creationId xmlns:a16="http://schemas.microsoft.com/office/drawing/2014/main" id="{67D071D9-0260-4E25-B678-9D38452DF66B}"/>
-              </a:ext>
-            </a:extLst>
-          </p:cNvPr>
-          <p:cNvSpPr/>
-          <p:nvPr/>
-        </p:nvSpPr>
-        <p:spPr>
-          <a:xfrm>
-            <a:off x="8412309" y="1544782"/>
-            <a:ext cx="1524001" cy="1184563"/>
-          </a:xfrm>
-          <a:prstGeom prst="rect">
-            <a:avLst/>
-          </a:prstGeom>
-        </p:spPr>
-        <p:style>
-          <a:lnRef idx="2">
-            <a:schemeClr val="accent3">
-              <a:shade val="50000"/>
-            </a:schemeClr>
-          </a:lnRef>
-          <a:fillRef idx="1">
-            <a:schemeClr val="accent3"/>
-          </a:fillRef>
-          <a:effectRef idx="0">
-            <a:schemeClr val="accent3"/>
-          </a:effectRef>
-          <a:fontRef idx="minor">
-            <a:schemeClr val="lt1"/>
-          </a:fontRef>
-        </p:style>
-        <p:txBody>
-          <a:bodyPr rtlCol="0" anchor="ctr"/>
-          <a:lstStyle/>
-          <a:p>
-            <a:pPr algn="ctr"/>
-            <a:r>
-              <a:rPr lang="de-DE" sz="1600" b="1" dirty="0"/>
-              <a:t>.</a:t>
-            </a:r>
-            <a:r>
-              <a:rPr lang="de-DE" sz="1600" b="1" dirty="0" err="1"/>
-              <a:t>csv</a:t>
-            </a:r>
-            <a:r>
-              <a:rPr lang="de-DE" sz="1600" b="1" dirty="0"/>
-              <a:t> </a:t>
-            </a:r>
-            <a:r>
-              <a:rPr lang="de-DE" sz="1600" b="1" dirty="0" err="1"/>
-              <a:t>files</a:t>
-            </a:r>
-            <a:r>
-              <a:rPr lang="de-DE" sz="1600" b="1" dirty="0"/>
-              <a:t> of </a:t>
-            </a:r>
-            <a:r>
-              <a:rPr lang="de-DE" sz="1600" b="1" dirty="0" err="1"/>
-              <a:t>loss</a:t>
-            </a:r>
-            <a:r>
-              <a:rPr lang="de-DE" sz="1600" b="1" dirty="0"/>
-              <a:t> </a:t>
-            </a:r>
-            <a:r>
-              <a:rPr lang="de-DE" sz="1600" b="1" dirty="0" err="1"/>
-              <a:t>documentation</a:t>
-            </a:r>
-            <a:endParaRPr lang="de-DE" sz="1600" b="1" dirty="0"/>
-          </a:p>
-        </p:txBody>
-      </p:sp>
-      <p:sp>
-        <p:nvSpPr>
           <p:cNvPr id="64" name="Rechteck 63">
             <a:extLst>
               <a:ext uri="{FF2B5EF4-FFF2-40B4-BE49-F238E27FC236}">
@@ -5595,84 +5223,6 @@
       </p:sp>
       <p:sp>
         <p:nvSpPr>
-          <p:cNvPr id="65" name="Rechteck 64">
-            <a:extLst>
-              <a:ext uri="{FF2B5EF4-FFF2-40B4-BE49-F238E27FC236}">
-                <a16:creationId xmlns:a16="http://schemas.microsoft.com/office/drawing/2014/main" id="{F86600E6-F53C-4319-AA25-32C72AC037D1}"/>
-              </a:ext>
-            </a:extLst>
-          </p:cNvPr>
-          <p:cNvSpPr/>
-          <p:nvPr/>
-        </p:nvSpPr>
-        <p:spPr>
-          <a:xfrm>
-            <a:off x="8412309" y="3408219"/>
-            <a:ext cx="1524001" cy="1184563"/>
-          </a:xfrm>
-          <a:prstGeom prst="rect">
-            <a:avLst/>
-          </a:prstGeom>
-        </p:spPr>
-        <p:style>
-          <a:lnRef idx="2">
-            <a:schemeClr val="accent3">
-              <a:shade val="50000"/>
-            </a:schemeClr>
-          </a:lnRef>
-          <a:fillRef idx="1">
-            <a:schemeClr val="accent3"/>
-          </a:fillRef>
-          <a:effectRef idx="0">
-            <a:schemeClr val="accent3"/>
-          </a:effectRef>
-          <a:fontRef idx="minor">
-            <a:schemeClr val="lt1"/>
-          </a:fontRef>
-        </p:style>
-        <p:txBody>
-          <a:bodyPr rtlCol="0" anchor="ctr"/>
-          <a:lstStyle/>
-          <a:p>
-            <a:pPr algn="ctr"/>
-            <a:r>
-              <a:rPr lang="de-DE" sz="1600" b="1" dirty="0"/>
-              <a:t>.</a:t>
-            </a:r>
-            <a:r>
-              <a:rPr lang="de-DE" sz="1600" b="1" dirty="0" err="1"/>
-              <a:t>csv</a:t>
-            </a:r>
-            <a:r>
-              <a:rPr lang="de-DE" sz="1600" b="1" dirty="0"/>
-              <a:t> </a:t>
-            </a:r>
-            <a:r>
-              <a:rPr lang="de-DE" sz="1600" b="1" dirty="0" err="1"/>
-              <a:t>files</a:t>
-            </a:r>
-            <a:r>
-              <a:rPr lang="de-DE" sz="1600" b="1" dirty="0"/>
-              <a:t> of </a:t>
-            </a:r>
-            <a:r>
-              <a:rPr lang="de-DE" sz="1600" b="1" dirty="0" err="1"/>
-              <a:t>loss</a:t>
-            </a:r>
-            <a:r>
-              <a:rPr lang="de-DE" sz="1600" b="1" dirty="0"/>
-              <a:t> </a:t>
-            </a:r>
-            <a:r>
-              <a:rPr lang="de-DE" sz="1600" b="1" dirty="0" err="1"/>
-              <a:t>documentation</a:t>
-            </a:r>
-            <a:endParaRPr lang="de-DE" sz="1600" b="1" dirty="0"/>
-          </a:p>
-        </p:txBody>
-      </p:sp>
-      <p:sp>
-        <p:nvSpPr>
           <p:cNvPr id="66" name="Rechteck 65">
             <a:extLst>
               <a:ext uri="{FF2B5EF4-FFF2-40B4-BE49-F238E27FC236}">
@@ -5730,84 +5280,6 @@
       </p:sp>
       <p:sp>
         <p:nvSpPr>
-          <p:cNvPr id="67" name="Rechteck 66">
-            <a:extLst>
-              <a:ext uri="{FF2B5EF4-FFF2-40B4-BE49-F238E27FC236}">
-                <a16:creationId xmlns:a16="http://schemas.microsoft.com/office/drawing/2014/main" id="{2DC3C862-05DC-4B2D-B2EA-DE0F7EB879A8}"/>
-              </a:ext>
-            </a:extLst>
-          </p:cNvPr>
-          <p:cNvSpPr/>
-          <p:nvPr/>
-        </p:nvSpPr>
-        <p:spPr>
-          <a:xfrm>
-            <a:off x="8412309" y="5243945"/>
-            <a:ext cx="1524001" cy="1184563"/>
-          </a:xfrm>
-          <a:prstGeom prst="rect">
-            <a:avLst/>
-          </a:prstGeom>
-        </p:spPr>
-        <p:style>
-          <a:lnRef idx="2">
-            <a:schemeClr val="accent3">
-              <a:shade val="50000"/>
-            </a:schemeClr>
-          </a:lnRef>
-          <a:fillRef idx="1">
-            <a:schemeClr val="accent3"/>
-          </a:fillRef>
-          <a:effectRef idx="0">
-            <a:schemeClr val="accent3"/>
-          </a:effectRef>
-          <a:fontRef idx="minor">
-            <a:schemeClr val="lt1"/>
-          </a:fontRef>
-        </p:style>
-        <p:txBody>
-          <a:bodyPr rtlCol="0" anchor="ctr"/>
-          <a:lstStyle/>
-          <a:p>
-            <a:pPr algn="ctr"/>
-            <a:r>
-              <a:rPr lang="de-DE" sz="1600" b="1" dirty="0"/>
-              <a:t>.</a:t>
-            </a:r>
-            <a:r>
-              <a:rPr lang="de-DE" sz="1600" b="1" dirty="0" err="1"/>
-              <a:t>csv</a:t>
-            </a:r>
-            <a:r>
-              <a:rPr lang="de-DE" sz="1600" b="1" dirty="0"/>
-              <a:t> </a:t>
-            </a:r>
-            <a:r>
-              <a:rPr lang="de-DE" sz="1600" b="1" dirty="0" err="1"/>
-              <a:t>files</a:t>
-            </a:r>
-            <a:r>
-              <a:rPr lang="de-DE" sz="1600" b="1" dirty="0"/>
-              <a:t> of </a:t>
-            </a:r>
-            <a:r>
-              <a:rPr lang="de-DE" sz="1600" b="1" dirty="0" err="1"/>
-              <a:t>loss</a:t>
-            </a:r>
-            <a:r>
-              <a:rPr lang="de-DE" sz="1600" b="1" dirty="0"/>
-              <a:t> </a:t>
-            </a:r>
-            <a:r>
-              <a:rPr lang="de-DE" sz="1600" b="1" dirty="0" err="1"/>
-              <a:t>documentation</a:t>
-            </a:r>
-            <a:endParaRPr lang="de-DE" sz="1600" b="1" dirty="0"/>
-          </a:p>
-        </p:txBody>
-      </p:sp>
-      <p:sp>
-        <p:nvSpPr>
           <p:cNvPr id="68" name="Rechteck 67">
             <a:extLst>
               <a:ext uri="{FF2B5EF4-FFF2-40B4-BE49-F238E27FC236}">
@@ -5860,6 +5332,866 @@
               <a:rPr lang="de-DE" sz="1600" b="1" dirty="0"/>
               <a:t> Test Images</a:t>
             </a:r>
+          </a:p>
+        </p:txBody>
+      </p:sp>
+      <p:sp>
+        <p:nvSpPr>
+          <p:cNvPr id="33" name="Rechteck 32">
+            <a:extLst>
+              <a:ext uri="{FF2B5EF4-FFF2-40B4-BE49-F238E27FC236}">
+                <a16:creationId xmlns:a16="http://schemas.microsoft.com/office/drawing/2014/main" id="{08CDEBDC-8859-4B55-AC2B-F471A719DDDB}"/>
+              </a:ext>
+            </a:extLst>
+          </p:cNvPr>
+          <p:cNvSpPr/>
+          <p:nvPr/>
+        </p:nvSpPr>
+        <p:spPr>
+          <a:xfrm>
+            <a:off x="335975" y="3408218"/>
+            <a:ext cx="1591540" cy="1184563"/>
+          </a:xfrm>
+          <a:prstGeom prst="rect">
+            <a:avLst/>
+          </a:prstGeom>
+        </p:spPr>
+        <p:style>
+          <a:lnRef idx="2">
+            <a:schemeClr val="accent3">
+              <a:shade val="50000"/>
+            </a:schemeClr>
+          </a:lnRef>
+          <a:fillRef idx="1">
+            <a:schemeClr val="accent3"/>
+          </a:fillRef>
+          <a:effectRef idx="0">
+            <a:schemeClr val="accent3"/>
+          </a:effectRef>
+          <a:fontRef idx="minor">
+            <a:schemeClr val="lt1"/>
+          </a:fontRef>
+        </p:style>
+        <p:txBody>
+          <a:bodyPr rtlCol="0" anchor="ctr"/>
+          <a:lstStyle/>
+          <a:p>
+            <a:pPr algn="ctr"/>
+            <a:r>
+              <a:rPr lang="de-DE" sz="1600" b="1" dirty="0"/>
+              <a:t>.</a:t>
+            </a:r>
+            <a:r>
+              <a:rPr lang="de-DE" sz="1600" b="1" dirty="0" err="1"/>
+              <a:t>csv</a:t>
+            </a:r>
+            <a:r>
+              <a:rPr lang="de-DE" sz="1600" b="1" dirty="0"/>
+              <a:t> </a:t>
+            </a:r>
+            <a:r>
+              <a:rPr lang="de-DE" sz="1600" b="1" dirty="0" err="1"/>
+              <a:t>files</a:t>
+            </a:r>
+            <a:r>
+              <a:rPr lang="de-DE" sz="1600" b="1" dirty="0"/>
+              <a:t> </a:t>
+            </a:r>
+            <a:r>
+              <a:rPr lang="de-DE" sz="1600" b="1" dirty="0" err="1"/>
+              <a:t>for</a:t>
+            </a:r>
+            <a:r>
+              <a:rPr lang="de-DE" sz="1600" b="1" dirty="0"/>
+              <a:t> </a:t>
+            </a:r>
+            <a:r>
+              <a:rPr lang="de-DE" sz="1600" b="1" dirty="0" err="1"/>
+              <a:t>loss</a:t>
+            </a:r>
+            <a:r>
+              <a:rPr lang="de-DE" sz="1600" b="1" dirty="0"/>
+              <a:t> </a:t>
+            </a:r>
+            <a:r>
+              <a:rPr lang="de-DE" sz="1600" b="1" dirty="0" err="1"/>
+              <a:t>documentation</a:t>
+            </a:r>
+            <a:endParaRPr lang="de-DE" sz="1600" b="1" dirty="0"/>
+          </a:p>
+        </p:txBody>
+      </p:sp>
+      <p:sp>
+        <p:nvSpPr>
+          <p:cNvPr id="34" name="Rechteck 33">
+            <a:extLst>
+              <a:ext uri="{FF2B5EF4-FFF2-40B4-BE49-F238E27FC236}">
+                <a16:creationId xmlns:a16="http://schemas.microsoft.com/office/drawing/2014/main" id="{EC434725-519C-4493-BA31-DDC71A3E4D0C}"/>
+              </a:ext>
+            </a:extLst>
+          </p:cNvPr>
+          <p:cNvSpPr/>
+          <p:nvPr/>
+        </p:nvSpPr>
+        <p:spPr>
+          <a:xfrm>
+            <a:off x="335975" y="5243945"/>
+            <a:ext cx="1591540" cy="1184563"/>
+          </a:xfrm>
+          <a:prstGeom prst="rect">
+            <a:avLst/>
+          </a:prstGeom>
+        </p:spPr>
+        <p:style>
+          <a:lnRef idx="2">
+            <a:schemeClr val="accent3">
+              <a:shade val="50000"/>
+            </a:schemeClr>
+          </a:lnRef>
+          <a:fillRef idx="1">
+            <a:schemeClr val="accent3"/>
+          </a:fillRef>
+          <a:effectRef idx="0">
+            <a:schemeClr val="accent3"/>
+          </a:effectRef>
+          <a:fontRef idx="minor">
+            <a:schemeClr val="lt1"/>
+          </a:fontRef>
+        </p:style>
+        <p:txBody>
+          <a:bodyPr rtlCol="0" anchor="ctr"/>
+          <a:lstStyle/>
+          <a:p>
+            <a:pPr algn="ctr"/>
+            <a:r>
+              <a:rPr lang="de-DE" sz="1600" b="1" dirty="0"/>
+              <a:t>.</a:t>
+            </a:r>
+            <a:r>
+              <a:rPr lang="de-DE" sz="1600" b="1" dirty="0" err="1"/>
+              <a:t>csv</a:t>
+            </a:r>
+            <a:r>
+              <a:rPr lang="de-DE" sz="1600" b="1" dirty="0"/>
+              <a:t> </a:t>
+            </a:r>
+            <a:r>
+              <a:rPr lang="de-DE" sz="1600" b="1" dirty="0" err="1"/>
+              <a:t>files</a:t>
+            </a:r>
+            <a:r>
+              <a:rPr lang="de-DE" sz="1600" b="1" dirty="0"/>
+              <a:t> </a:t>
+            </a:r>
+            <a:r>
+              <a:rPr lang="de-DE" sz="1600" b="1" dirty="0" err="1"/>
+              <a:t>for</a:t>
+            </a:r>
+            <a:r>
+              <a:rPr lang="de-DE" sz="1600" b="1" dirty="0"/>
+              <a:t> </a:t>
+            </a:r>
+            <a:r>
+              <a:rPr lang="de-DE" sz="1600" b="1" dirty="0" err="1"/>
+              <a:t>loss</a:t>
+            </a:r>
+            <a:r>
+              <a:rPr lang="de-DE" sz="1600" b="1" dirty="0"/>
+              <a:t> </a:t>
+            </a:r>
+            <a:r>
+              <a:rPr lang="de-DE" sz="1600" b="1" dirty="0" err="1"/>
+              <a:t>documentation</a:t>
+            </a:r>
+            <a:endParaRPr lang="de-DE" sz="1600" b="1" dirty="0"/>
+          </a:p>
+        </p:txBody>
+      </p:sp>
+      <p:sp>
+        <p:nvSpPr>
+          <p:cNvPr id="35" name="Rechteck 34">
+            <a:extLst>
+              <a:ext uri="{FF2B5EF4-FFF2-40B4-BE49-F238E27FC236}">
+                <a16:creationId xmlns:a16="http://schemas.microsoft.com/office/drawing/2014/main" id="{E04B8EAC-436B-41E9-BB25-2C352ACBD030}"/>
+              </a:ext>
+            </a:extLst>
+          </p:cNvPr>
+          <p:cNvSpPr/>
+          <p:nvPr/>
+        </p:nvSpPr>
+        <p:spPr>
+          <a:xfrm>
+            <a:off x="335975" y="1544783"/>
+            <a:ext cx="1591540" cy="1184563"/>
+          </a:xfrm>
+          <a:prstGeom prst="rect">
+            <a:avLst/>
+          </a:prstGeom>
+        </p:spPr>
+        <p:style>
+          <a:lnRef idx="2">
+            <a:schemeClr val="accent3">
+              <a:shade val="50000"/>
+            </a:schemeClr>
+          </a:lnRef>
+          <a:fillRef idx="1">
+            <a:schemeClr val="accent3"/>
+          </a:fillRef>
+          <a:effectRef idx="0">
+            <a:schemeClr val="accent3"/>
+          </a:effectRef>
+          <a:fontRef idx="minor">
+            <a:schemeClr val="lt1"/>
+          </a:fontRef>
+        </p:style>
+        <p:txBody>
+          <a:bodyPr rtlCol="0" anchor="ctr"/>
+          <a:lstStyle/>
+          <a:p>
+            <a:pPr algn="ctr"/>
+            <a:r>
+              <a:rPr lang="de-DE" sz="1600" b="1" dirty="0"/>
+              <a:t>.</a:t>
+            </a:r>
+            <a:r>
+              <a:rPr lang="de-DE" sz="1600" b="1" dirty="0" err="1"/>
+              <a:t>csv</a:t>
+            </a:r>
+            <a:r>
+              <a:rPr lang="de-DE" sz="1600" b="1" dirty="0"/>
+              <a:t> </a:t>
+            </a:r>
+            <a:r>
+              <a:rPr lang="de-DE" sz="1600" b="1" dirty="0" err="1"/>
+              <a:t>files</a:t>
+            </a:r>
+            <a:r>
+              <a:rPr lang="de-DE" sz="1600" b="1" dirty="0"/>
+              <a:t> </a:t>
+            </a:r>
+            <a:r>
+              <a:rPr lang="de-DE" sz="1600" b="1" dirty="0" err="1"/>
+              <a:t>for</a:t>
+            </a:r>
+            <a:r>
+              <a:rPr lang="de-DE" sz="1600" b="1" dirty="0"/>
+              <a:t> </a:t>
+            </a:r>
+            <a:r>
+              <a:rPr lang="de-DE" sz="1600" b="1" dirty="0" err="1"/>
+              <a:t>loss</a:t>
+            </a:r>
+            <a:r>
+              <a:rPr lang="de-DE" sz="1600" b="1" dirty="0"/>
+              <a:t> </a:t>
+            </a:r>
+            <a:r>
+              <a:rPr lang="de-DE" sz="1600" b="1" dirty="0" err="1"/>
+              <a:t>documentation</a:t>
+            </a:r>
+            <a:endParaRPr lang="de-DE" sz="1600" b="1" dirty="0"/>
+          </a:p>
+        </p:txBody>
+      </p:sp>
+      <p:sp>
+        <p:nvSpPr>
+          <p:cNvPr id="36" name="Rechteck 35">
+            <a:extLst>
+              <a:ext uri="{FF2B5EF4-FFF2-40B4-BE49-F238E27FC236}">
+                <a16:creationId xmlns:a16="http://schemas.microsoft.com/office/drawing/2014/main" id="{D5FAE8E4-F2ED-4EFC-AB01-18F5998C7EE4}"/>
+              </a:ext>
+            </a:extLst>
+          </p:cNvPr>
+          <p:cNvSpPr/>
+          <p:nvPr/>
+        </p:nvSpPr>
+        <p:spPr>
+          <a:xfrm>
+            <a:off x="335975" y="3408219"/>
+            <a:ext cx="1591540" cy="1184563"/>
+          </a:xfrm>
+          <a:prstGeom prst="rect">
+            <a:avLst/>
+          </a:prstGeom>
+        </p:spPr>
+        <p:style>
+          <a:lnRef idx="2">
+            <a:schemeClr val="accent3">
+              <a:shade val="50000"/>
+            </a:schemeClr>
+          </a:lnRef>
+          <a:fillRef idx="1">
+            <a:schemeClr val="accent3"/>
+          </a:fillRef>
+          <a:effectRef idx="0">
+            <a:schemeClr val="accent3"/>
+          </a:effectRef>
+          <a:fontRef idx="minor">
+            <a:schemeClr val="lt1"/>
+          </a:fontRef>
+        </p:style>
+        <p:txBody>
+          <a:bodyPr rtlCol="0" anchor="ctr"/>
+          <a:lstStyle/>
+          <a:p>
+            <a:pPr algn="ctr"/>
+            <a:r>
+              <a:rPr lang="de-DE" sz="1600" b="1" dirty="0"/>
+              <a:t>.</a:t>
+            </a:r>
+            <a:r>
+              <a:rPr lang="de-DE" sz="1600" b="1" dirty="0" err="1"/>
+              <a:t>csv</a:t>
+            </a:r>
+            <a:r>
+              <a:rPr lang="de-DE" sz="1600" b="1" dirty="0"/>
+              <a:t> </a:t>
+            </a:r>
+            <a:r>
+              <a:rPr lang="de-DE" sz="1600" b="1" dirty="0" err="1"/>
+              <a:t>files</a:t>
+            </a:r>
+            <a:r>
+              <a:rPr lang="de-DE" sz="1600" b="1" dirty="0"/>
+              <a:t> </a:t>
+            </a:r>
+            <a:r>
+              <a:rPr lang="de-DE" sz="1600" b="1" dirty="0" err="1"/>
+              <a:t>for</a:t>
+            </a:r>
+            <a:r>
+              <a:rPr lang="de-DE" sz="1600" b="1" dirty="0"/>
+              <a:t> </a:t>
+            </a:r>
+            <a:r>
+              <a:rPr lang="de-DE" sz="1600" b="1" dirty="0" err="1"/>
+              <a:t>loss</a:t>
+            </a:r>
+            <a:r>
+              <a:rPr lang="de-DE" sz="1600" b="1" dirty="0"/>
+              <a:t> </a:t>
+            </a:r>
+            <a:r>
+              <a:rPr lang="de-DE" sz="1600" b="1" dirty="0" err="1"/>
+              <a:t>documentation</a:t>
+            </a:r>
+            <a:endParaRPr lang="de-DE" sz="1600" b="1" dirty="0"/>
+          </a:p>
+        </p:txBody>
+      </p:sp>
+      <p:sp>
+        <p:nvSpPr>
+          <p:cNvPr id="37" name="Rechteck 36">
+            <a:extLst>
+              <a:ext uri="{FF2B5EF4-FFF2-40B4-BE49-F238E27FC236}">
+                <a16:creationId xmlns:a16="http://schemas.microsoft.com/office/drawing/2014/main" id="{98B8FD18-9357-4E22-9EDD-1431BC382BCC}"/>
+              </a:ext>
+            </a:extLst>
+          </p:cNvPr>
+          <p:cNvSpPr/>
+          <p:nvPr/>
+        </p:nvSpPr>
+        <p:spPr>
+          <a:xfrm>
+            <a:off x="4379338" y="5240484"/>
+            <a:ext cx="1591540" cy="1184563"/>
+          </a:xfrm>
+          <a:prstGeom prst="rect">
+            <a:avLst/>
+          </a:prstGeom>
+        </p:spPr>
+        <p:style>
+          <a:lnRef idx="2">
+            <a:schemeClr val="accent3">
+              <a:shade val="50000"/>
+            </a:schemeClr>
+          </a:lnRef>
+          <a:fillRef idx="1">
+            <a:schemeClr val="accent3"/>
+          </a:fillRef>
+          <a:effectRef idx="0">
+            <a:schemeClr val="accent3"/>
+          </a:effectRef>
+          <a:fontRef idx="minor">
+            <a:schemeClr val="lt1"/>
+          </a:fontRef>
+        </p:style>
+        <p:txBody>
+          <a:bodyPr rtlCol="0" anchor="ctr"/>
+          <a:lstStyle/>
+          <a:p>
+            <a:pPr algn="ctr"/>
+            <a:r>
+              <a:rPr lang="de-DE" sz="1600" b="1" dirty="0"/>
+              <a:t>.</a:t>
+            </a:r>
+            <a:r>
+              <a:rPr lang="de-DE" sz="1600" b="1" dirty="0" err="1"/>
+              <a:t>csv</a:t>
+            </a:r>
+            <a:r>
+              <a:rPr lang="de-DE" sz="1600" b="1" dirty="0"/>
+              <a:t> </a:t>
+            </a:r>
+            <a:r>
+              <a:rPr lang="de-DE" sz="1600" b="1" dirty="0" err="1"/>
+              <a:t>files</a:t>
+            </a:r>
+            <a:r>
+              <a:rPr lang="de-DE" sz="1600" b="1" dirty="0"/>
+              <a:t> </a:t>
+            </a:r>
+            <a:r>
+              <a:rPr lang="de-DE" sz="1600" b="1" dirty="0" err="1"/>
+              <a:t>for</a:t>
+            </a:r>
+            <a:r>
+              <a:rPr lang="de-DE" sz="1600" b="1" dirty="0"/>
+              <a:t> </a:t>
+            </a:r>
+            <a:r>
+              <a:rPr lang="de-DE" sz="1600" b="1" dirty="0" err="1"/>
+              <a:t>loss</a:t>
+            </a:r>
+            <a:r>
+              <a:rPr lang="de-DE" sz="1600" b="1" dirty="0"/>
+              <a:t> </a:t>
+            </a:r>
+            <a:r>
+              <a:rPr lang="de-DE" sz="1600" b="1" dirty="0" err="1"/>
+              <a:t>documentation</a:t>
+            </a:r>
+            <a:endParaRPr lang="de-DE" sz="1600" b="1" dirty="0"/>
+          </a:p>
+        </p:txBody>
+      </p:sp>
+      <p:sp>
+        <p:nvSpPr>
+          <p:cNvPr id="38" name="Rechteck 37">
+            <a:extLst>
+              <a:ext uri="{FF2B5EF4-FFF2-40B4-BE49-F238E27FC236}">
+                <a16:creationId xmlns:a16="http://schemas.microsoft.com/office/drawing/2014/main" id="{7CFE4C23-2EBB-40D8-8B26-8658D490CC5A}"/>
+              </a:ext>
+            </a:extLst>
+          </p:cNvPr>
+          <p:cNvSpPr/>
+          <p:nvPr/>
+        </p:nvSpPr>
+        <p:spPr>
+          <a:xfrm>
+            <a:off x="4379338" y="1541322"/>
+            <a:ext cx="1591540" cy="1184563"/>
+          </a:xfrm>
+          <a:prstGeom prst="rect">
+            <a:avLst/>
+          </a:prstGeom>
+        </p:spPr>
+        <p:style>
+          <a:lnRef idx="2">
+            <a:schemeClr val="accent3">
+              <a:shade val="50000"/>
+            </a:schemeClr>
+          </a:lnRef>
+          <a:fillRef idx="1">
+            <a:schemeClr val="accent3"/>
+          </a:fillRef>
+          <a:effectRef idx="0">
+            <a:schemeClr val="accent3"/>
+          </a:effectRef>
+          <a:fontRef idx="minor">
+            <a:schemeClr val="lt1"/>
+          </a:fontRef>
+        </p:style>
+        <p:txBody>
+          <a:bodyPr rtlCol="0" anchor="ctr"/>
+          <a:lstStyle/>
+          <a:p>
+            <a:pPr algn="ctr"/>
+            <a:r>
+              <a:rPr lang="de-DE" sz="1600" b="1" dirty="0"/>
+              <a:t>.</a:t>
+            </a:r>
+            <a:r>
+              <a:rPr lang="de-DE" sz="1600" b="1" dirty="0" err="1"/>
+              <a:t>csv</a:t>
+            </a:r>
+            <a:r>
+              <a:rPr lang="de-DE" sz="1600" b="1" dirty="0"/>
+              <a:t> </a:t>
+            </a:r>
+            <a:r>
+              <a:rPr lang="de-DE" sz="1600" b="1" dirty="0" err="1"/>
+              <a:t>files</a:t>
+            </a:r>
+            <a:r>
+              <a:rPr lang="de-DE" sz="1600" b="1" dirty="0"/>
+              <a:t> </a:t>
+            </a:r>
+            <a:r>
+              <a:rPr lang="de-DE" sz="1600" b="1" dirty="0" err="1"/>
+              <a:t>for</a:t>
+            </a:r>
+            <a:r>
+              <a:rPr lang="de-DE" sz="1600" b="1" dirty="0"/>
+              <a:t> </a:t>
+            </a:r>
+            <a:r>
+              <a:rPr lang="de-DE" sz="1600" b="1" dirty="0" err="1"/>
+              <a:t>loss</a:t>
+            </a:r>
+            <a:r>
+              <a:rPr lang="de-DE" sz="1600" b="1" dirty="0"/>
+              <a:t> </a:t>
+            </a:r>
+            <a:r>
+              <a:rPr lang="de-DE" sz="1600" b="1" dirty="0" err="1"/>
+              <a:t>documentation</a:t>
+            </a:r>
+            <a:endParaRPr lang="de-DE" sz="1600" b="1" dirty="0"/>
+          </a:p>
+        </p:txBody>
+      </p:sp>
+      <p:sp>
+        <p:nvSpPr>
+          <p:cNvPr id="39" name="Rechteck 38">
+            <a:extLst>
+              <a:ext uri="{FF2B5EF4-FFF2-40B4-BE49-F238E27FC236}">
+                <a16:creationId xmlns:a16="http://schemas.microsoft.com/office/drawing/2014/main" id="{FF2BA3A4-25D2-4695-AFBA-A2B1F3FE8680}"/>
+              </a:ext>
+            </a:extLst>
+          </p:cNvPr>
+          <p:cNvSpPr/>
+          <p:nvPr/>
+        </p:nvSpPr>
+        <p:spPr>
+          <a:xfrm>
+            <a:off x="4379338" y="3404758"/>
+            <a:ext cx="1591540" cy="1184563"/>
+          </a:xfrm>
+          <a:prstGeom prst="rect">
+            <a:avLst/>
+          </a:prstGeom>
+        </p:spPr>
+        <p:style>
+          <a:lnRef idx="2">
+            <a:schemeClr val="accent3">
+              <a:shade val="50000"/>
+            </a:schemeClr>
+          </a:lnRef>
+          <a:fillRef idx="1">
+            <a:schemeClr val="accent3"/>
+          </a:fillRef>
+          <a:effectRef idx="0">
+            <a:schemeClr val="accent3"/>
+          </a:effectRef>
+          <a:fontRef idx="minor">
+            <a:schemeClr val="lt1"/>
+          </a:fontRef>
+        </p:style>
+        <p:txBody>
+          <a:bodyPr rtlCol="0" anchor="ctr"/>
+          <a:lstStyle/>
+          <a:p>
+            <a:pPr algn="ctr"/>
+            <a:r>
+              <a:rPr lang="de-DE" sz="1600" b="1" dirty="0"/>
+              <a:t>.</a:t>
+            </a:r>
+            <a:r>
+              <a:rPr lang="de-DE" sz="1600" b="1" dirty="0" err="1"/>
+              <a:t>csv</a:t>
+            </a:r>
+            <a:r>
+              <a:rPr lang="de-DE" sz="1600" b="1" dirty="0"/>
+              <a:t> </a:t>
+            </a:r>
+            <a:r>
+              <a:rPr lang="de-DE" sz="1600" b="1" dirty="0" err="1"/>
+              <a:t>files</a:t>
+            </a:r>
+            <a:r>
+              <a:rPr lang="de-DE" sz="1600" b="1" dirty="0"/>
+              <a:t> </a:t>
+            </a:r>
+            <a:r>
+              <a:rPr lang="de-DE" sz="1600" b="1" dirty="0" err="1"/>
+              <a:t>for</a:t>
+            </a:r>
+            <a:r>
+              <a:rPr lang="de-DE" sz="1600" b="1" dirty="0"/>
+              <a:t> </a:t>
+            </a:r>
+            <a:r>
+              <a:rPr lang="de-DE" sz="1600" b="1" dirty="0" err="1"/>
+              <a:t>loss</a:t>
+            </a:r>
+            <a:r>
+              <a:rPr lang="de-DE" sz="1600" b="1" dirty="0"/>
+              <a:t> </a:t>
+            </a:r>
+            <a:r>
+              <a:rPr lang="de-DE" sz="1600" b="1" dirty="0" err="1"/>
+              <a:t>documentation</a:t>
+            </a:r>
+            <a:endParaRPr lang="de-DE" sz="1600" b="1" dirty="0"/>
+          </a:p>
+        </p:txBody>
+      </p:sp>
+      <p:sp>
+        <p:nvSpPr>
+          <p:cNvPr id="69" name="Rechteck 68">
+            <a:extLst>
+              <a:ext uri="{FF2B5EF4-FFF2-40B4-BE49-F238E27FC236}">
+                <a16:creationId xmlns:a16="http://schemas.microsoft.com/office/drawing/2014/main" id="{EE4B6165-1D81-4784-9AFC-4B8B94831217}"/>
+              </a:ext>
+            </a:extLst>
+          </p:cNvPr>
+          <p:cNvSpPr/>
+          <p:nvPr/>
+        </p:nvSpPr>
+        <p:spPr>
+          <a:xfrm>
+            <a:off x="8407142" y="5240484"/>
+            <a:ext cx="1591540" cy="1184563"/>
+          </a:xfrm>
+          <a:prstGeom prst="rect">
+            <a:avLst/>
+          </a:prstGeom>
+        </p:spPr>
+        <p:style>
+          <a:lnRef idx="2">
+            <a:schemeClr val="accent3">
+              <a:shade val="50000"/>
+            </a:schemeClr>
+          </a:lnRef>
+          <a:fillRef idx="1">
+            <a:schemeClr val="accent3"/>
+          </a:fillRef>
+          <a:effectRef idx="0">
+            <a:schemeClr val="accent3"/>
+          </a:effectRef>
+          <a:fontRef idx="minor">
+            <a:schemeClr val="lt1"/>
+          </a:fontRef>
+        </p:style>
+        <p:txBody>
+          <a:bodyPr rtlCol="0" anchor="ctr"/>
+          <a:lstStyle/>
+          <a:p>
+            <a:pPr algn="ctr"/>
+            <a:r>
+              <a:rPr lang="de-DE" sz="1600" b="1" dirty="0"/>
+              <a:t>.</a:t>
+            </a:r>
+            <a:r>
+              <a:rPr lang="de-DE" sz="1600" b="1" dirty="0" err="1"/>
+              <a:t>csv</a:t>
+            </a:r>
+            <a:r>
+              <a:rPr lang="de-DE" sz="1600" b="1" dirty="0"/>
+              <a:t> </a:t>
+            </a:r>
+            <a:r>
+              <a:rPr lang="de-DE" sz="1600" b="1" dirty="0" err="1"/>
+              <a:t>files</a:t>
+            </a:r>
+            <a:r>
+              <a:rPr lang="de-DE" sz="1600" b="1" dirty="0"/>
+              <a:t> </a:t>
+            </a:r>
+            <a:r>
+              <a:rPr lang="de-DE" sz="1600" b="1" dirty="0" err="1"/>
+              <a:t>for</a:t>
+            </a:r>
+            <a:r>
+              <a:rPr lang="de-DE" sz="1600" b="1" dirty="0"/>
+              <a:t> </a:t>
+            </a:r>
+            <a:r>
+              <a:rPr lang="de-DE" sz="1600" b="1" dirty="0" err="1"/>
+              <a:t>loss</a:t>
+            </a:r>
+            <a:r>
+              <a:rPr lang="de-DE" sz="1600" b="1" dirty="0"/>
+              <a:t> </a:t>
+            </a:r>
+            <a:r>
+              <a:rPr lang="de-DE" sz="1600" b="1" dirty="0" err="1"/>
+              <a:t>documentation</a:t>
+            </a:r>
+            <a:endParaRPr lang="de-DE" sz="1600" b="1" dirty="0"/>
+          </a:p>
+        </p:txBody>
+      </p:sp>
+      <p:sp>
+        <p:nvSpPr>
+          <p:cNvPr id="70" name="Rechteck 69">
+            <a:extLst>
+              <a:ext uri="{FF2B5EF4-FFF2-40B4-BE49-F238E27FC236}">
+                <a16:creationId xmlns:a16="http://schemas.microsoft.com/office/drawing/2014/main" id="{EF21AA87-B332-4BD4-B1AC-F4D2EAB64714}"/>
+              </a:ext>
+            </a:extLst>
+          </p:cNvPr>
+          <p:cNvSpPr/>
+          <p:nvPr/>
+        </p:nvSpPr>
+        <p:spPr>
+          <a:xfrm>
+            <a:off x="8407142" y="1541322"/>
+            <a:ext cx="1591540" cy="1184563"/>
+          </a:xfrm>
+          <a:prstGeom prst="rect">
+            <a:avLst/>
+          </a:prstGeom>
+        </p:spPr>
+        <p:style>
+          <a:lnRef idx="2">
+            <a:schemeClr val="accent3">
+              <a:shade val="50000"/>
+            </a:schemeClr>
+          </a:lnRef>
+          <a:fillRef idx="1">
+            <a:schemeClr val="accent3"/>
+          </a:fillRef>
+          <a:effectRef idx="0">
+            <a:schemeClr val="accent3"/>
+          </a:effectRef>
+          <a:fontRef idx="minor">
+            <a:schemeClr val="lt1"/>
+          </a:fontRef>
+        </p:style>
+        <p:txBody>
+          <a:bodyPr rtlCol="0" anchor="ctr"/>
+          <a:lstStyle/>
+          <a:p>
+            <a:pPr algn="ctr"/>
+            <a:r>
+              <a:rPr lang="de-DE" sz="1600" b="1" dirty="0"/>
+              <a:t>.</a:t>
+            </a:r>
+            <a:r>
+              <a:rPr lang="de-DE" sz="1600" b="1" dirty="0" err="1"/>
+              <a:t>csv</a:t>
+            </a:r>
+            <a:r>
+              <a:rPr lang="de-DE" sz="1600" b="1" dirty="0"/>
+              <a:t> </a:t>
+            </a:r>
+            <a:r>
+              <a:rPr lang="de-DE" sz="1600" b="1" dirty="0" err="1"/>
+              <a:t>files</a:t>
+            </a:r>
+            <a:r>
+              <a:rPr lang="de-DE" sz="1600" b="1" dirty="0"/>
+              <a:t> </a:t>
+            </a:r>
+            <a:r>
+              <a:rPr lang="de-DE" sz="1600" b="1" dirty="0" err="1"/>
+              <a:t>for</a:t>
+            </a:r>
+            <a:r>
+              <a:rPr lang="de-DE" sz="1600" b="1" dirty="0"/>
+              <a:t> </a:t>
+            </a:r>
+            <a:r>
+              <a:rPr lang="de-DE" sz="1600" b="1" dirty="0" err="1"/>
+              <a:t>loss</a:t>
+            </a:r>
+            <a:r>
+              <a:rPr lang="de-DE" sz="1600" b="1" dirty="0"/>
+              <a:t> </a:t>
+            </a:r>
+            <a:r>
+              <a:rPr lang="de-DE" sz="1600" b="1" dirty="0" err="1"/>
+              <a:t>documentation</a:t>
+            </a:r>
+            <a:endParaRPr lang="de-DE" sz="1600" b="1" dirty="0"/>
+          </a:p>
+        </p:txBody>
+      </p:sp>
+      <p:sp>
+        <p:nvSpPr>
+          <p:cNvPr id="71" name="Rechteck 70">
+            <a:extLst>
+              <a:ext uri="{FF2B5EF4-FFF2-40B4-BE49-F238E27FC236}">
+                <a16:creationId xmlns:a16="http://schemas.microsoft.com/office/drawing/2014/main" id="{423AD83E-9395-42DF-A018-8AD4709EBAA8}"/>
+              </a:ext>
+            </a:extLst>
+          </p:cNvPr>
+          <p:cNvSpPr/>
+          <p:nvPr/>
+        </p:nvSpPr>
+        <p:spPr>
+          <a:xfrm>
+            <a:off x="8407142" y="3404758"/>
+            <a:ext cx="1591540" cy="1184563"/>
+          </a:xfrm>
+          <a:prstGeom prst="rect">
+            <a:avLst/>
+          </a:prstGeom>
+        </p:spPr>
+        <p:style>
+          <a:lnRef idx="2">
+            <a:schemeClr val="accent3">
+              <a:shade val="50000"/>
+            </a:schemeClr>
+          </a:lnRef>
+          <a:fillRef idx="1">
+            <a:schemeClr val="accent3"/>
+          </a:fillRef>
+          <a:effectRef idx="0">
+            <a:schemeClr val="accent3"/>
+          </a:effectRef>
+          <a:fontRef idx="minor">
+            <a:schemeClr val="lt1"/>
+          </a:fontRef>
+        </p:style>
+        <p:txBody>
+          <a:bodyPr rtlCol="0" anchor="ctr"/>
+          <a:lstStyle/>
+          <a:p>
+            <a:pPr algn="ctr"/>
+            <a:r>
+              <a:rPr lang="de-DE" sz="1600" b="1" dirty="0"/>
+              <a:t>.</a:t>
+            </a:r>
+            <a:r>
+              <a:rPr lang="de-DE" sz="1600" b="1" dirty="0" err="1"/>
+              <a:t>csv</a:t>
+            </a:r>
+            <a:r>
+              <a:rPr lang="de-DE" sz="1600" b="1" dirty="0"/>
+              <a:t> </a:t>
+            </a:r>
+            <a:r>
+              <a:rPr lang="de-DE" sz="1600" b="1" dirty="0" err="1"/>
+              <a:t>files</a:t>
+            </a:r>
+            <a:r>
+              <a:rPr lang="de-DE" sz="1600" b="1" dirty="0"/>
+              <a:t> </a:t>
+            </a:r>
+            <a:r>
+              <a:rPr lang="de-DE" sz="1600" b="1" dirty="0" err="1"/>
+              <a:t>for</a:t>
+            </a:r>
+            <a:r>
+              <a:rPr lang="de-DE" sz="1600" b="1" dirty="0"/>
+              <a:t> </a:t>
+            </a:r>
+            <a:r>
+              <a:rPr lang="de-DE" sz="1600" b="1" dirty="0" err="1"/>
+              <a:t>loss</a:t>
+            </a:r>
+            <a:r>
+              <a:rPr lang="de-DE" sz="1600" b="1" dirty="0"/>
+              <a:t> </a:t>
+            </a:r>
+            <a:r>
+              <a:rPr lang="de-DE" sz="1600" b="1" dirty="0" err="1"/>
+              <a:t>documentation</a:t>
+            </a:r>
+            <a:endParaRPr lang="de-DE" sz="1600" b="1" dirty="0"/>
           </a:p>
         </p:txBody>
       </p:sp>

</xml_diff>